<commit_message>
Lenguajes de programación e ingeniería de software
</commit_message>
<xml_diff>
--- a/CursodeFundamentosdeIngenieriadeDatos/guia-de-retos-curso-fundamentos-ingenieria-de-datos-students.pptx
+++ b/CursodeFundamentosdeIngenieriadeDatos/guia-de-retos-curso-fundamentos-ingenieria-de-datos-students.pptx
@@ -4886,7 +4886,7 @@
           <p:nvPr>
             <p:extLst>
               <p:ext uri="{D42A27DB-BD31-4B8C-83A1-F6EECF244321}">
-                <p14:modId xmlns:p14="http://schemas.microsoft.com/office/powerpoint/2010/main" val="2982529520"/>
+                <p14:modId xmlns:p14="http://schemas.microsoft.com/office/powerpoint/2010/main" val="1956730478"/>
               </p:ext>
             </p:extLst>
           </p:nvPr>
@@ -6083,15 +6083,70 @@
                         </a:spcAft>
                         <a:buNone/>
                       </a:pPr>
-                      <a:endParaRPr sz="1100" i="1" dirty="0">
-                        <a:solidFill>
-                          <a:srgbClr val="D9D9D9"/>
-                        </a:solidFill>
-                        <a:latin typeface="Roboto"/>
-                        <a:ea typeface="Roboto"/>
-                        <a:cs typeface="Roboto"/>
-                        <a:sym typeface="Roboto"/>
-                      </a:endParaRPr>
+                      <a:r>
+                        <a:rPr lang="es-MX" sz="1100" i="0" dirty="0">
+                          <a:solidFill>
+                            <a:schemeClr val="tx1"/>
+                          </a:solidFill>
+                          <a:latin typeface="Roboto"/>
+                          <a:ea typeface="Roboto"/>
+                          <a:cs typeface="Roboto"/>
+                          <a:sym typeface="Roboto"/>
+                        </a:rPr>
+                        <a:t>Tesla – innovación y visión a futuro.</a:t>
+                      </a:r>
+                    </a:p>
+                    <a:p>
+                      <a:pPr marL="0" lvl="0" indent="0" algn="l" rtl="0">
+                        <a:lnSpc>
+                          <a:spcPct val="115000"/>
+                        </a:lnSpc>
+                        <a:spcBef>
+                          <a:spcPts val="0"/>
+                        </a:spcBef>
+                        <a:spcAft>
+                          <a:spcPts val="0"/>
+                        </a:spcAft>
+                        <a:buNone/>
+                      </a:pPr>
+                      <a:r>
+                        <a:rPr lang="es-MX" sz="1100" i="0" dirty="0">
+                          <a:solidFill>
+                            <a:schemeClr val="tx1"/>
+                          </a:solidFill>
+                          <a:latin typeface="Roboto"/>
+                          <a:ea typeface="Roboto"/>
+                          <a:cs typeface="Roboto"/>
+                          <a:sym typeface="Roboto"/>
+                        </a:rPr>
+                        <a:t>Google – Gran empresa de software e AI.</a:t>
+                      </a:r>
+                    </a:p>
+                    <a:p>
+                      <a:pPr marL="0" lvl="0" indent="0" algn="l" rtl="0">
+                        <a:lnSpc>
+                          <a:spcPct val="115000"/>
+                        </a:lnSpc>
+                        <a:spcBef>
+                          <a:spcPts val="0"/>
+                        </a:spcBef>
+                        <a:spcAft>
+                          <a:spcPts val="0"/>
+                        </a:spcAft>
+                        <a:buNone/>
+                      </a:pPr>
+                      <a:r>
+                        <a:rPr lang="es-MX" sz="1100" i="0" dirty="0">
+                          <a:solidFill>
+                            <a:schemeClr val="tx1"/>
+                          </a:solidFill>
+                          <a:latin typeface="Roboto"/>
+                          <a:ea typeface="Roboto"/>
+                          <a:cs typeface="Roboto"/>
+                          <a:sym typeface="Roboto"/>
+                        </a:rPr>
+                        <a:t>Apple – Su gran flexibilidad al trabajar en la compañía</a:t>
+                      </a:r>
                     </a:p>
                   </a:txBody>
                   <a:tcPr marL="63500" marR="63500" marT="63500" marB="63500">
@@ -6436,9 +6491,141 @@
                         </a:spcAft>
                         <a:buNone/>
                       </a:pPr>
-                      <a:endParaRPr sz="1100" i="1" dirty="0">
+                      <a:r>
+                        <a:rPr lang="es-ES" sz="1100" i="0" dirty="0">
+                          <a:solidFill>
+                            <a:schemeClr val="tx1"/>
+                          </a:solidFill>
+                          <a:latin typeface="Roboto"/>
+                          <a:ea typeface="Roboto"/>
+                          <a:cs typeface="Roboto"/>
+                          <a:sym typeface="Roboto"/>
+                        </a:rPr>
+                        <a:t>DevOps </a:t>
+                      </a:r>
+                      <a:r>
+                        <a:rPr lang="es-ES" sz="1100" i="0" dirty="0" err="1">
+                          <a:solidFill>
+                            <a:schemeClr val="tx1"/>
+                          </a:solidFill>
+                          <a:latin typeface="Roboto"/>
+                          <a:ea typeface="Roboto"/>
+                          <a:cs typeface="Roboto"/>
+                          <a:sym typeface="Roboto"/>
+                        </a:rPr>
+                        <a:t>Engineer</a:t>
+                      </a:r>
+                      <a:r>
+                        <a:rPr lang="es-ES" sz="1100" i="0" dirty="0">
+                          <a:solidFill>
+                            <a:schemeClr val="tx1"/>
+                          </a:solidFill>
+                          <a:latin typeface="Roboto"/>
+                          <a:ea typeface="Roboto"/>
+                          <a:cs typeface="Roboto"/>
+                          <a:sym typeface="Roboto"/>
+                        </a:rPr>
+                        <a:t>, Google </a:t>
+                      </a:r>
+                      <a:r>
+                        <a:rPr lang="es-ES" sz="1100" i="0" dirty="0" err="1">
+                          <a:solidFill>
+                            <a:schemeClr val="tx1"/>
+                          </a:solidFill>
+                          <a:latin typeface="Roboto"/>
+                          <a:ea typeface="Roboto"/>
+                          <a:cs typeface="Roboto"/>
+                          <a:sym typeface="Roboto"/>
+                        </a:rPr>
+                        <a:t>Colab</a:t>
+                      </a:r>
+                      <a:r>
+                        <a:rPr lang="es-ES" sz="1100" i="0" dirty="0">
+                          <a:solidFill>
+                            <a:schemeClr val="tx1"/>
+                          </a:solidFill>
+                          <a:latin typeface="Roboto"/>
+                          <a:ea typeface="Roboto"/>
+                          <a:cs typeface="Roboto"/>
+                          <a:sym typeface="Roboto"/>
+                        </a:rPr>
+                        <a:t>, </a:t>
+                      </a:r>
+                      <a:r>
+                        <a:rPr lang="es-ES" sz="1100" i="0" dirty="0" err="1">
+                          <a:solidFill>
+                            <a:schemeClr val="tx1"/>
+                          </a:solidFill>
+                          <a:latin typeface="Roboto"/>
+                          <a:ea typeface="Roboto"/>
+                          <a:cs typeface="Roboto"/>
+                          <a:sym typeface="Roboto"/>
+                        </a:rPr>
+                        <a:t>Librerias</a:t>
+                      </a:r>
+                      <a:r>
+                        <a:rPr lang="es-ES" sz="1100" i="0" dirty="0">
+                          <a:solidFill>
+                            <a:schemeClr val="tx1"/>
+                          </a:solidFill>
+                          <a:latin typeface="Roboto"/>
+                          <a:ea typeface="Roboto"/>
+                          <a:cs typeface="Roboto"/>
+                          <a:sym typeface="Roboto"/>
+                        </a:rPr>
+                        <a:t> de Python, </a:t>
+                      </a:r>
+                      <a:r>
+                        <a:rPr lang="es-ES" sz="1100" i="0" dirty="0" err="1">
+                          <a:solidFill>
+                            <a:schemeClr val="tx1"/>
+                          </a:solidFill>
+                          <a:latin typeface="Roboto"/>
+                          <a:ea typeface="Roboto"/>
+                          <a:cs typeface="Roboto"/>
+                          <a:sym typeface="Roboto"/>
+                        </a:rPr>
+                        <a:t>TensorFLow</a:t>
+                      </a:r>
+                      <a:r>
+                        <a:rPr lang="es-ES" sz="1100" i="0" dirty="0">
+                          <a:solidFill>
+                            <a:schemeClr val="tx1"/>
+                          </a:solidFill>
+                          <a:latin typeface="Roboto"/>
+                          <a:ea typeface="Roboto"/>
+                          <a:cs typeface="Roboto"/>
+                          <a:sym typeface="Roboto"/>
+                        </a:rPr>
+                        <a:t>, </a:t>
+                      </a:r>
+                      <a:r>
+                        <a:rPr lang="es-ES" sz="1100" i="0" dirty="0" err="1">
+                          <a:solidFill>
+                            <a:schemeClr val="tx1"/>
+                          </a:solidFill>
+                          <a:latin typeface="Roboto"/>
+                          <a:ea typeface="Roboto"/>
+                          <a:cs typeface="Roboto"/>
+                          <a:sym typeface="Roboto"/>
+                        </a:rPr>
+                        <a:t>DataBrisk</a:t>
+                      </a:r>
+                      <a:r>
+                        <a:rPr lang="es-ES" sz="1100" i="0" dirty="0">
+                          <a:solidFill>
+                            <a:schemeClr val="tx1"/>
+                          </a:solidFill>
+                          <a:latin typeface="Roboto"/>
+                          <a:ea typeface="Roboto"/>
+                          <a:cs typeface="Roboto"/>
+                          <a:sym typeface="Roboto"/>
+                        </a:rPr>
+                        <a:t>.</a:t>
+                      </a:r>
+                      <a:endParaRPr sz="1100" i="0" dirty="0">
                         <a:solidFill>
-                          <a:srgbClr val="D9D9D9"/>
+                          <a:schemeClr val="tx1"/>
                         </a:solidFill>
                         <a:latin typeface="Roboto"/>
                         <a:ea typeface="Roboto"/>
@@ -6614,11 +6801,17 @@
         <p:nvGraphicFramePr>
           <p:cNvPr id="46" name="Google Shape;46;p6"/>
           <p:cNvGraphicFramePr/>
-          <p:nvPr/>
+          <p:nvPr>
+            <p:extLst>
+              <p:ext uri="{D42A27DB-BD31-4B8C-83A1-F6EECF244321}">
+                <p14:modId xmlns:p14="http://schemas.microsoft.com/office/powerpoint/2010/main" val="294512785"/>
+              </p:ext>
+            </p:extLst>
+          </p:nvPr>
         </p:nvGraphicFramePr>
         <p:xfrm>
           <a:off x="497100" y="1162050"/>
-          <a:ext cx="3000000" cy="3000000"/>
+          <a:ext cx="6778175" cy="7953970"/>
         </p:xfrm>
         <a:graphic>
           <a:graphicData uri="http://schemas.openxmlformats.org/drawingml/2006/table">
@@ -7108,7 +7301,7 @@
                         <a:buNone/>
                       </a:pPr>
                       <a:r>
-                        <a:rPr lang="en" sz="1000" b="1">
+                        <a:rPr lang="en" sz="1000" b="1" dirty="0">
                           <a:latin typeface="Roboto"/>
                           <a:ea typeface="Roboto"/>
                           <a:cs typeface="Roboto"/>
@@ -7116,7 +7309,7 @@
                         </a:rPr>
                         <a:t>Kanban vs. Scrum</a:t>
                       </a:r>
-                      <a:endParaRPr sz="1000" b="1">
+                      <a:endParaRPr sz="1000" b="1" dirty="0">
                         <a:latin typeface="Roboto"/>
                         <a:ea typeface="Roboto"/>
                         <a:cs typeface="Roboto"/>
@@ -7136,7 +7329,7 @@
                         </a:spcAft>
                         <a:buNone/>
                       </a:pPr>
-                      <a:endParaRPr sz="1000" b="1">
+                      <a:endParaRPr sz="1000" b="1" dirty="0">
                         <a:latin typeface="Roboto"/>
                         <a:ea typeface="Roboto"/>
                         <a:cs typeface="Roboto"/>
@@ -7157,7 +7350,7 @@
                         <a:buNone/>
                       </a:pPr>
                       <a:r>
-                        <a:rPr lang="en" sz="1000">
+                        <a:rPr lang="en" sz="1000" dirty="0">
                           <a:latin typeface="Roboto"/>
                           <a:ea typeface="Roboto"/>
                           <a:cs typeface="Roboto"/>
@@ -7165,7 +7358,7 @@
                         </a:rPr>
                         <a:t>Instrucciones:</a:t>
                       </a:r>
-                      <a:endParaRPr sz="1000">
+                      <a:endParaRPr sz="1000" dirty="0">
                         <a:latin typeface="Roboto"/>
                         <a:ea typeface="Roboto"/>
                         <a:cs typeface="Roboto"/>
@@ -7186,7 +7379,7 @@
                         <a:buNone/>
                       </a:pPr>
                       <a:r>
-                        <a:rPr lang="en" sz="1000">
+                        <a:rPr lang="en" sz="1000" dirty="0">
                           <a:latin typeface="Roboto"/>
                           <a:ea typeface="Roboto"/>
                           <a:cs typeface="Roboto"/>
@@ -7194,7 +7387,7 @@
                         </a:rPr>
                         <a:t>¿Qué diferencias encuentras entre ellos?</a:t>
                       </a:r>
-                      <a:endParaRPr sz="1000">
+                      <a:endParaRPr sz="1000" dirty="0">
                         <a:latin typeface="Roboto"/>
                         <a:ea typeface="Roboto"/>
                         <a:cs typeface="Roboto"/>
@@ -7215,7 +7408,7 @@
                         <a:buNone/>
                       </a:pPr>
                       <a:r>
-                        <a:rPr lang="en" sz="1000">
+                        <a:rPr lang="en" sz="1000" dirty="0">
                           <a:latin typeface="Roboto"/>
                           <a:ea typeface="Roboto"/>
                           <a:cs typeface="Roboto"/>
@@ -7223,7 +7416,7 @@
                         </a:rPr>
                         <a:t>¿Qué ventajas y desventajas observas en cada uno?</a:t>
                       </a:r>
-                      <a:endParaRPr sz="1000">
+                      <a:endParaRPr sz="1000" dirty="0">
                         <a:latin typeface="Roboto"/>
                         <a:ea typeface="Roboto"/>
                         <a:cs typeface="Roboto"/>
@@ -7288,20 +7481,20 @@
                         <a:buNone/>
                       </a:pPr>
                       <a:r>
-                        <a:rPr lang="en" sz="1100" i="1">
+                        <a:rPr lang="en" sz="1100" i="0" dirty="0">
                           <a:solidFill>
-                            <a:srgbClr val="CCCCCC"/>
+                            <a:schemeClr val="tx1"/>
                           </a:solidFill>
                           <a:latin typeface="Roboto"/>
                           <a:ea typeface="Roboto"/>
                           <a:cs typeface="Roboto"/>
                           <a:sym typeface="Roboto"/>
                         </a:rPr>
-                        <a:t>Escribe aquí tus respuestas.</a:t>
+                        <a:t>Scrum se da por semanas y Kanban por dias, el scrum es mas estricto con la entrega del trabajo y el otro es mas flexible</a:t>
                       </a:r>
-                      <a:endParaRPr sz="1100" i="1">
+                      <a:endParaRPr sz="1100" i="0" dirty="0">
                         <a:solidFill>
-                          <a:srgbClr val="CCCCCC"/>
+                          <a:schemeClr val="tx1"/>
                         </a:solidFill>
                         <a:latin typeface="Roboto"/>
                         <a:ea typeface="Roboto"/>
@@ -7603,13 +7796,103 @@
                         </a:spcAft>
                         <a:buNone/>
                       </a:pPr>
-                      <a:endParaRPr sz="1100" i="1">
+                      <a:r>
+                        <a:rPr lang="es-ES" sz="1100" b="0" i="1" dirty="0" err="1">
+                          <a:solidFill>
+                            <a:schemeClr val="tx1"/>
+                          </a:solidFill>
+                          <a:latin typeface="Roboto" panose="02000000000000000000" pitchFamily="2" charset="0"/>
+                          <a:ea typeface="Roboto" panose="02000000000000000000" pitchFamily="2" charset="0"/>
+                          <a:cs typeface="Roboto" panose="02000000000000000000" pitchFamily="2" charset="0"/>
+                          <a:sym typeface="Roboto"/>
+                        </a:rPr>
+                        <a:t>Numpy</a:t>
+                      </a:r>
+                      <a:r>
+                        <a:rPr lang="es-ES" sz="1100" b="0" i="1" dirty="0">
+                          <a:solidFill>
+                            <a:schemeClr val="tx1"/>
+                          </a:solidFill>
+                          <a:latin typeface="Roboto" panose="02000000000000000000" pitchFamily="2" charset="0"/>
+                          <a:ea typeface="Roboto" panose="02000000000000000000" pitchFamily="2" charset="0"/>
+                          <a:cs typeface="Roboto" panose="02000000000000000000" pitchFamily="2" charset="0"/>
+                          <a:sym typeface="Roboto"/>
+                        </a:rPr>
+                        <a:t>, pandas, </a:t>
+                      </a:r>
+                      <a:r>
+                        <a:rPr lang="es-CO" sz="1100" b="0" dirty="0" err="1">
+                          <a:solidFill>
+                            <a:schemeClr val="tx1"/>
+                          </a:solidFill>
+                          <a:latin typeface="Roboto" panose="02000000000000000000" pitchFamily="2" charset="0"/>
+                          <a:ea typeface="Roboto" panose="02000000000000000000" pitchFamily="2" charset="0"/>
+                          <a:cs typeface="Roboto" panose="02000000000000000000" pitchFamily="2" charset="0"/>
+                        </a:rPr>
+                        <a:t>Scikit-learn</a:t>
+                      </a:r>
+                      <a:r>
+                        <a:rPr lang="es-CO" sz="1100" b="0" dirty="0">
+                          <a:solidFill>
+                            <a:schemeClr val="tx1"/>
+                          </a:solidFill>
+                          <a:latin typeface="Roboto" panose="02000000000000000000" pitchFamily="2" charset="0"/>
+                          <a:ea typeface="Roboto" panose="02000000000000000000" pitchFamily="2" charset="0"/>
+                          <a:cs typeface="Roboto" panose="02000000000000000000" pitchFamily="2" charset="0"/>
+                        </a:rPr>
+                        <a:t>, </a:t>
+                      </a:r>
+                      <a:r>
+                        <a:rPr lang="es-CO" sz="1100" b="0" dirty="0" err="1">
+                          <a:solidFill>
+                            <a:schemeClr val="tx1"/>
+                          </a:solidFill>
+                          <a:latin typeface="Roboto" panose="02000000000000000000" pitchFamily="2" charset="0"/>
+                          <a:ea typeface="Roboto" panose="02000000000000000000" pitchFamily="2" charset="0"/>
+                          <a:cs typeface="Roboto" panose="02000000000000000000" pitchFamily="2" charset="0"/>
+                        </a:rPr>
+                        <a:t>Matplotlib,TensorFlow</a:t>
+                      </a:r>
+                      <a:r>
+                        <a:rPr lang="es-CO" sz="1100" b="0" dirty="0">
+                          <a:solidFill>
+                            <a:schemeClr val="tx1"/>
+                          </a:solidFill>
+                          <a:latin typeface="Roboto" panose="02000000000000000000" pitchFamily="2" charset="0"/>
+                          <a:ea typeface="Roboto" panose="02000000000000000000" pitchFamily="2" charset="0"/>
+                          <a:cs typeface="Roboto" panose="02000000000000000000" pitchFamily="2" charset="0"/>
+                        </a:rPr>
+                        <a:t>, </a:t>
+                      </a:r>
+                      <a:r>
+                        <a:rPr lang="es-CO" sz="1100" b="0" dirty="0" err="1">
+                          <a:solidFill>
+                            <a:schemeClr val="tx1"/>
+                          </a:solidFill>
+                          <a:latin typeface="Roboto" panose="02000000000000000000" pitchFamily="2" charset="0"/>
+                          <a:ea typeface="Roboto" panose="02000000000000000000" pitchFamily="2" charset="0"/>
+                          <a:cs typeface="Roboto" panose="02000000000000000000" pitchFamily="2" charset="0"/>
+                        </a:rPr>
+                        <a:t>PySpark</a:t>
+                      </a:r>
+                      <a:r>
+                        <a:rPr lang="es-CO" sz="1100" b="0">
+                          <a:solidFill>
+                            <a:schemeClr val="tx1"/>
+                          </a:solidFill>
+                          <a:latin typeface="Roboto" panose="02000000000000000000" pitchFamily="2" charset="0"/>
+                          <a:ea typeface="Roboto" panose="02000000000000000000" pitchFamily="2" charset="0"/>
+                          <a:cs typeface="Roboto" panose="02000000000000000000" pitchFamily="2" charset="0"/>
+                        </a:rPr>
+                        <a:t>.</a:t>
+                      </a:r>
+                      <a:endParaRPr sz="1100" b="0" i="1" dirty="0">
                         <a:solidFill>
-                          <a:srgbClr val="D9D9D9"/>
+                          <a:schemeClr val="tx1"/>
                         </a:solidFill>
-                        <a:latin typeface="Roboto"/>
-                        <a:ea typeface="Roboto"/>
-                        <a:cs typeface="Roboto"/>
+                        <a:latin typeface="Roboto" panose="02000000000000000000" pitchFamily="2" charset="0"/>
+                        <a:ea typeface="Roboto" panose="02000000000000000000" pitchFamily="2" charset="0"/>
+                        <a:cs typeface="Roboto" panose="02000000000000000000" pitchFamily="2" charset="0"/>
                         <a:sym typeface="Roboto"/>
                       </a:endParaRPr>
                     </a:p>
@@ -8961,7 +9244,7 @@
                         </a:spcAft>
                         <a:buNone/>
                       </a:pPr>
-                      <a:endParaRPr sz="1100" i="1">
+                      <a:endParaRPr sz="1100" i="1" dirty="0">
                         <a:solidFill>
                           <a:srgbClr val="D9D9D9"/>
                         </a:solidFill>

</xml_diff>

<commit_message>
End of the Data Engineering Fundamentals Course
</commit_message>
<xml_diff>
--- a/CursodeFundamentosdeIngenieriadeDatos/guia-de-retos-curso-fundamentos-ingenieria-de-datos-students.pptx
+++ b/CursodeFundamentosdeIngenieriadeDatos/guia-de-retos-curso-fundamentos-ingenieria-de-datos-students.pptx
@@ -9981,14 +9981,14 @@
           <p:nvPr>
             <p:extLst>
               <p:ext uri="{D42A27DB-BD31-4B8C-83A1-F6EECF244321}">
-                <p14:modId xmlns:p14="http://schemas.microsoft.com/office/powerpoint/2010/main" val="522082669"/>
+                <p14:modId xmlns:p14="http://schemas.microsoft.com/office/powerpoint/2010/main" val="602015422"/>
               </p:ext>
             </p:extLst>
           </p:nvPr>
         </p:nvGraphicFramePr>
         <p:xfrm>
           <a:off x="497100" y="1162050"/>
-          <a:ext cx="6778175" cy="7494606"/>
+          <a:ext cx="6778175" cy="7989087"/>
         </p:xfrm>
         <a:graphic>
           <a:graphicData uri="http://schemas.openxmlformats.org/drawingml/2006/table">
@@ -11632,9 +11632,237 @@
                         </a:spcAft>
                         <a:buNone/>
                       </a:pPr>
-                      <a:endParaRPr sz="1100" i="1">
+                      <a:r>
+                        <a:rPr lang="es-ES" sz="1100" b="0" i="0" dirty="0" err="1">
+                          <a:solidFill>
+                            <a:schemeClr val="tx1"/>
+                          </a:solidFill>
+                          <a:latin typeface="Roboto"/>
+                          <a:ea typeface="Roboto"/>
+                          <a:cs typeface="Roboto"/>
+                          <a:sym typeface="Roboto"/>
+                        </a:rPr>
+                        <a:t>Unittest</a:t>
+                      </a:r>
+                      <a:r>
+                        <a:rPr lang="es-ES" sz="1100" b="0" i="0" dirty="0">
+                          <a:solidFill>
+                            <a:schemeClr val="tx1"/>
+                          </a:solidFill>
+                          <a:latin typeface="Roboto"/>
+                          <a:ea typeface="Roboto"/>
+                          <a:cs typeface="Roboto"/>
+                          <a:sym typeface="Roboto"/>
+                        </a:rPr>
+                        <a:t>, </a:t>
+                      </a:r>
+                      <a:r>
+                        <a:rPr lang="es-ES" sz="1100" b="0" i="0" dirty="0" err="1">
+                          <a:solidFill>
+                            <a:schemeClr val="tx1"/>
+                          </a:solidFill>
+                          <a:latin typeface="Roboto"/>
+                          <a:ea typeface="Roboto"/>
+                          <a:cs typeface="Roboto"/>
+                          <a:sym typeface="Roboto"/>
+                        </a:rPr>
+                        <a:t>pytest</a:t>
+                      </a:r>
+                      <a:r>
+                        <a:rPr lang="es-ES" sz="1100" b="0" i="0" dirty="0">
+                          <a:solidFill>
+                            <a:schemeClr val="tx1"/>
+                          </a:solidFill>
+                          <a:latin typeface="Roboto"/>
+                          <a:ea typeface="Roboto"/>
+                          <a:cs typeface="Roboto"/>
+                          <a:sym typeface="Roboto"/>
+                        </a:rPr>
+                        <a:t>, nose2, </a:t>
+                      </a:r>
+                      <a:r>
+                        <a:rPr lang="es-ES" sz="1100" b="0" i="0" dirty="0" err="1">
+                          <a:solidFill>
+                            <a:schemeClr val="tx1"/>
+                          </a:solidFill>
+                          <a:latin typeface="Roboto"/>
+                          <a:ea typeface="Roboto"/>
+                          <a:cs typeface="Roboto"/>
+                          <a:sym typeface="Roboto"/>
+                        </a:rPr>
+                        <a:t>doctest</a:t>
+                      </a:r>
+                      <a:r>
+                        <a:rPr lang="es-ES" sz="1100" b="0" i="0" dirty="0">
+                          <a:solidFill>
+                            <a:schemeClr val="tx1"/>
+                          </a:solidFill>
+                          <a:latin typeface="Roboto"/>
+                          <a:ea typeface="Roboto"/>
+                          <a:cs typeface="Roboto"/>
+                          <a:sym typeface="Roboto"/>
+                        </a:rPr>
+                        <a:t>, </a:t>
+                      </a:r>
+                      <a:r>
+                        <a:rPr lang="es-ES" sz="1100" b="0" i="0" dirty="0" err="1">
+                          <a:solidFill>
+                            <a:schemeClr val="tx1"/>
+                          </a:solidFill>
+                          <a:latin typeface="Roboto"/>
+                          <a:ea typeface="Roboto"/>
+                          <a:cs typeface="Roboto"/>
+                          <a:sym typeface="Roboto"/>
+                        </a:rPr>
+                        <a:t>pytest-django</a:t>
+                      </a:r>
+                      <a:r>
+                        <a:rPr lang="es-ES" sz="1100" b="0" i="0" dirty="0">
+                          <a:solidFill>
+                            <a:schemeClr val="tx1"/>
+                          </a:solidFill>
+                          <a:latin typeface="Roboto"/>
+                          <a:ea typeface="Roboto"/>
+                          <a:cs typeface="Roboto"/>
+                          <a:sym typeface="Roboto"/>
+                        </a:rPr>
+                        <a:t>, </a:t>
+                      </a:r>
+                      <a:r>
+                        <a:rPr lang="es-ES" sz="1100" b="0" i="0" dirty="0" err="1">
+                          <a:solidFill>
+                            <a:schemeClr val="tx1"/>
+                          </a:solidFill>
+                          <a:latin typeface="Roboto"/>
+                          <a:ea typeface="Roboto"/>
+                          <a:cs typeface="Roboto"/>
+                          <a:sym typeface="Roboto"/>
+                        </a:rPr>
+                        <a:t>postman</a:t>
+                      </a:r>
+                      <a:r>
+                        <a:rPr lang="es-ES" sz="1100" b="0" i="0" dirty="0">
+                          <a:solidFill>
+                            <a:schemeClr val="tx1"/>
+                          </a:solidFill>
+                          <a:latin typeface="Roboto"/>
+                          <a:ea typeface="Roboto"/>
+                          <a:cs typeface="Roboto"/>
+                          <a:sym typeface="Roboto"/>
+                        </a:rPr>
+                        <a:t>, pandas-</a:t>
+                      </a:r>
+                      <a:r>
+                        <a:rPr lang="es-ES" sz="1100" b="0" i="0" dirty="0" err="1">
+                          <a:solidFill>
+                            <a:schemeClr val="tx1"/>
+                          </a:solidFill>
+                          <a:latin typeface="Roboto"/>
+                          <a:ea typeface="Roboto"/>
+                          <a:cs typeface="Roboto"/>
+                          <a:sym typeface="Roboto"/>
+                        </a:rPr>
+                        <a:t>testing</a:t>
+                      </a:r>
+                      <a:r>
+                        <a:rPr lang="es-ES" sz="1100" b="0" i="0" dirty="0">
+                          <a:solidFill>
+                            <a:schemeClr val="tx1"/>
+                          </a:solidFill>
+                          <a:latin typeface="Roboto"/>
+                          <a:ea typeface="Roboto"/>
+                          <a:cs typeface="Roboto"/>
+                          <a:sym typeface="Roboto"/>
+                        </a:rPr>
+                        <a:t>, </a:t>
+                      </a:r>
+                      <a:r>
+                        <a:rPr lang="es-ES" sz="1100" b="0" i="0" dirty="0" err="1">
+                          <a:solidFill>
+                            <a:schemeClr val="tx1"/>
+                          </a:solidFill>
+                          <a:latin typeface="Roboto"/>
+                          <a:ea typeface="Roboto"/>
+                          <a:cs typeface="Roboto"/>
+                          <a:sym typeface="Roboto"/>
+                        </a:rPr>
+                        <a:t>Pytest</a:t>
+                      </a:r>
+                      <a:r>
+                        <a:rPr lang="es-ES" sz="1100" b="0" i="0" dirty="0">
+                          <a:solidFill>
+                            <a:schemeClr val="tx1"/>
+                          </a:solidFill>
+                          <a:latin typeface="Roboto"/>
+                          <a:ea typeface="Roboto"/>
+                          <a:cs typeface="Roboto"/>
+                          <a:sym typeface="Roboto"/>
+                        </a:rPr>
+                        <a:t>-Pandas, </a:t>
+                      </a:r>
+                      <a:r>
+                        <a:rPr lang="es-ES" sz="1100" b="0" i="0" dirty="0" err="1">
+                          <a:solidFill>
+                            <a:schemeClr val="tx1"/>
+                          </a:solidFill>
+                          <a:latin typeface="Roboto"/>
+                          <a:ea typeface="Roboto"/>
+                          <a:cs typeface="Roboto"/>
+                          <a:sym typeface="Roboto"/>
+                        </a:rPr>
+                        <a:t>selenium</a:t>
+                      </a:r>
+                      <a:r>
+                        <a:rPr lang="es-ES" sz="1100" b="0" i="0" dirty="0">
+                          <a:solidFill>
+                            <a:schemeClr val="tx1"/>
+                          </a:solidFill>
+                          <a:latin typeface="Roboto"/>
+                          <a:ea typeface="Roboto"/>
+                          <a:cs typeface="Roboto"/>
+                          <a:sym typeface="Roboto"/>
+                        </a:rPr>
+                        <a:t>, </a:t>
+                      </a:r>
+                      <a:r>
+                        <a:rPr lang="es-ES" sz="1100" b="0" i="0" dirty="0" err="1">
+                          <a:solidFill>
+                            <a:schemeClr val="tx1"/>
+                          </a:solidFill>
+                          <a:latin typeface="Roboto"/>
+                          <a:ea typeface="Roboto"/>
+                          <a:cs typeface="Roboto"/>
+                          <a:sym typeface="Roboto"/>
+                        </a:rPr>
+                        <a:t>playwright</a:t>
+                      </a:r>
+                      <a:r>
+                        <a:rPr lang="es-ES" sz="1100" b="0" i="0" dirty="0">
+                          <a:solidFill>
+                            <a:schemeClr val="tx1"/>
+                          </a:solidFill>
+                          <a:latin typeface="Roboto"/>
+                          <a:ea typeface="Roboto"/>
+                          <a:cs typeface="Roboto"/>
+                          <a:sym typeface="Roboto"/>
+                        </a:rPr>
+                        <a:t>, </a:t>
+                      </a:r>
+                      <a:r>
+                        <a:rPr lang="es-ES" sz="1100" b="0" i="0" dirty="0" err="1">
+                          <a:solidFill>
+                            <a:schemeClr val="tx1"/>
+                          </a:solidFill>
+                          <a:latin typeface="Roboto"/>
+                          <a:ea typeface="Roboto"/>
+                          <a:cs typeface="Roboto"/>
+                          <a:sym typeface="Roboto"/>
+                        </a:rPr>
+                        <a:t>Cypress</a:t>
+                      </a:r>
+                      <a:endParaRPr sz="1100" b="0" i="0" dirty="0">
                         <a:solidFill>
-                          <a:srgbClr val="D9D9D9"/>
+                          <a:schemeClr val="tx1"/>
                         </a:solidFill>
                         <a:latin typeface="Roboto"/>
                         <a:ea typeface="Roboto"/>
@@ -11707,6 +11935,378 @@
                         <a:buNone/>
                       </a:pPr>
                       <a:r>
+                        <a:rPr lang="en" sz="1300" b="1" dirty="0">
+                          <a:solidFill>
+                            <a:srgbClr val="274E13"/>
+                          </a:solidFill>
+                          <a:latin typeface="Roboto"/>
+                          <a:ea typeface="Roboto"/>
+                          <a:cs typeface="Roboto"/>
+                          <a:sym typeface="Roboto"/>
+                        </a:rPr>
+                        <a:t>CI/CD basico</a:t>
+                      </a:r>
+                      <a:endParaRPr sz="1300" b="1" dirty="0">
+                        <a:solidFill>
+                          <a:srgbClr val="274E13"/>
+                        </a:solidFill>
+                        <a:latin typeface="Roboto"/>
+                        <a:ea typeface="Roboto"/>
+                        <a:cs typeface="Roboto"/>
+                        <a:sym typeface="Roboto"/>
+                      </a:endParaRPr>
+                    </a:p>
+                  </a:txBody>
+                  <a:tcPr marL="63500" marR="63500" marT="63500" marB="63500" anchor="ctr">
+                    <a:lnL w="12700" cap="flat" cmpd="sng">
+                      <a:solidFill>
+                        <a:srgbClr val="38761D"/>
+                      </a:solidFill>
+                      <a:prstDash val="solid"/>
+                      <a:round/>
+                      <a:headEnd type="none" w="sm" len="sm"/>
+                      <a:tailEnd type="none" w="sm" len="sm"/>
+                    </a:lnL>
+                    <a:lnR w="12700" cap="flat" cmpd="sng">
+                      <a:solidFill>
+                        <a:srgbClr val="38761D"/>
+                      </a:solidFill>
+                      <a:prstDash val="solid"/>
+                      <a:round/>
+                      <a:headEnd type="none" w="sm" len="sm"/>
+                      <a:tailEnd type="none" w="sm" len="sm"/>
+                    </a:lnR>
+                    <a:lnT w="12700" cap="flat" cmpd="sng">
+                      <a:solidFill>
+                        <a:srgbClr val="38761D"/>
+                      </a:solidFill>
+                      <a:prstDash val="solid"/>
+                      <a:round/>
+                      <a:headEnd type="none" w="sm" len="sm"/>
+                      <a:tailEnd type="none" w="sm" len="sm"/>
+                    </a:lnT>
+                    <a:lnB w="12700" cap="flat" cmpd="sng">
+                      <a:solidFill>
+                        <a:srgbClr val="38761D"/>
+                      </a:solidFill>
+                      <a:prstDash val="solid"/>
+                      <a:round/>
+                      <a:headEnd type="none" w="sm" len="sm"/>
+                      <a:tailEnd type="none" w="sm" len="sm"/>
+                    </a:lnB>
+                  </a:tcPr>
+                </a:tc>
+                <a:tc>
+                  <a:txBody>
+                    <a:bodyPr/>
+                    <a:lstStyle/>
+                    <a:p>
+                      <a:pPr marL="0" lvl="0" indent="0" algn="l" rtl="0">
+                        <a:lnSpc>
+                          <a:spcPct val="115000"/>
+                        </a:lnSpc>
+                        <a:spcBef>
+                          <a:spcPts val="0"/>
+                        </a:spcBef>
+                        <a:spcAft>
+                          <a:spcPts val="0"/>
+                        </a:spcAft>
+                        <a:buNone/>
+                      </a:pPr>
+                      <a:r>
+                        <a:rPr lang="en" sz="1000" b="1">
+                          <a:latin typeface="Roboto"/>
+                          <a:ea typeface="Roboto"/>
+                          <a:cs typeface="Roboto"/>
+                          <a:sym typeface="Roboto"/>
+                        </a:rPr>
+                        <a:t>DataOps vs. DevOps</a:t>
+                      </a:r>
+                      <a:endParaRPr sz="1000" b="1">
+                        <a:latin typeface="Roboto"/>
+                        <a:ea typeface="Roboto"/>
+                        <a:cs typeface="Roboto"/>
+                        <a:sym typeface="Roboto"/>
+                      </a:endParaRPr>
+                    </a:p>
+                    <a:p>
+                      <a:pPr marL="0" lvl="0" indent="0" algn="l" rtl="0">
+                        <a:lnSpc>
+                          <a:spcPct val="115000"/>
+                        </a:lnSpc>
+                        <a:spcBef>
+                          <a:spcPts val="0"/>
+                        </a:spcBef>
+                        <a:spcAft>
+                          <a:spcPts val="0"/>
+                        </a:spcAft>
+                        <a:buNone/>
+                      </a:pPr>
+                      <a:endParaRPr sz="1000" b="1">
+                        <a:latin typeface="Roboto"/>
+                        <a:ea typeface="Roboto"/>
+                        <a:cs typeface="Roboto"/>
+                        <a:sym typeface="Roboto"/>
+                      </a:endParaRPr>
+                    </a:p>
+                    <a:p>
+                      <a:pPr marL="0" lvl="0" indent="0" algn="l" rtl="0">
+                        <a:lnSpc>
+                          <a:spcPct val="115000"/>
+                        </a:lnSpc>
+                        <a:spcBef>
+                          <a:spcPts val="0"/>
+                        </a:spcBef>
+                        <a:spcAft>
+                          <a:spcPts val="0"/>
+                        </a:spcAft>
+                        <a:buNone/>
+                      </a:pPr>
+                      <a:r>
+                        <a:rPr lang="en" sz="1000">
+                          <a:latin typeface="Roboto"/>
+                          <a:ea typeface="Roboto"/>
+                          <a:cs typeface="Roboto"/>
+                          <a:sym typeface="Roboto"/>
+                        </a:rPr>
+                        <a:t>Instrucciones:</a:t>
+                      </a:r>
+                      <a:endParaRPr sz="1000">
+                        <a:latin typeface="Roboto"/>
+                        <a:ea typeface="Roboto"/>
+                        <a:cs typeface="Roboto"/>
+                        <a:sym typeface="Roboto"/>
+                      </a:endParaRPr>
+                    </a:p>
+                    <a:p>
+                      <a:pPr marL="0" lvl="0" indent="0" algn="l" rtl="0">
+                        <a:lnSpc>
+                          <a:spcPct val="115000"/>
+                        </a:lnSpc>
+                        <a:spcBef>
+                          <a:spcPts val="0"/>
+                        </a:spcBef>
+                        <a:spcAft>
+                          <a:spcPts val="0"/>
+                        </a:spcAft>
+                        <a:buNone/>
+                      </a:pPr>
+                      <a:r>
+                        <a:rPr lang="en" sz="1000">
+                          <a:latin typeface="Roboto"/>
+                          <a:ea typeface="Roboto"/>
+                          <a:cs typeface="Roboto"/>
+                          <a:sym typeface="Roboto"/>
+                        </a:rPr>
+                        <a:t>Investiga el límite entre ambas.</a:t>
+                      </a:r>
+                      <a:endParaRPr sz="1000">
+                        <a:latin typeface="Roboto"/>
+                        <a:ea typeface="Roboto"/>
+                        <a:cs typeface="Roboto"/>
+                        <a:sym typeface="Roboto"/>
+                      </a:endParaRPr>
+                    </a:p>
+                  </a:txBody>
+                  <a:tcPr marL="63500" marR="63500" marT="63500" marB="63500">
+                    <a:lnL w="12700" cap="flat" cmpd="sng">
+                      <a:solidFill>
+                        <a:srgbClr val="38761D"/>
+                      </a:solidFill>
+                      <a:prstDash val="solid"/>
+                      <a:round/>
+                      <a:headEnd type="none" w="sm" len="sm"/>
+                      <a:tailEnd type="none" w="sm" len="sm"/>
+                    </a:lnL>
+                    <a:lnR w="12700" cap="flat" cmpd="sng">
+                      <a:solidFill>
+                        <a:srgbClr val="38761D"/>
+                      </a:solidFill>
+                      <a:prstDash val="solid"/>
+                      <a:round/>
+                      <a:headEnd type="none" w="sm" len="sm"/>
+                      <a:tailEnd type="none" w="sm" len="sm"/>
+                    </a:lnR>
+                    <a:lnT w="12700" cap="flat" cmpd="sng">
+                      <a:solidFill>
+                        <a:srgbClr val="38761D"/>
+                      </a:solidFill>
+                      <a:prstDash val="solid"/>
+                      <a:round/>
+                      <a:headEnd type="none" w="sm" len="sm"/>
+                      <a:tailEnd type="none" w="sm" len="sm"/>
+                    </a:lnT>
+                    <a:lnB w="12700" cap="flat" cmpd="sng">
+                      <a:solidFill>
+                        <a:srgbClr val="38761D"/>
+                      </a:solidFill>
+                      <a:prstDash val="solid"/>
+                      <a:round/>
+                      <a:headEnd type="none" w="sm" len="sm"/>
+                      <a:tailEnd type="none" w="sm" len="sm"/>
+                    </a:lnB>
+                  </a:tcPr>
+                </a:tc>
+                <a:tc>
+                  <a:txBody>
+                    <a:bodyPr/>
+                    <a:lstStyle/>
+                    <a:p>
+                      <a:r>
+                        <a:rPr lang="es-MX" sz="600" b="1" dirty="0">
+                          <a:latin typeface="Roboto" panose="02000000000000000000" pitchFamily="2" charset="0"/>
+                          <a:ea typeface="Roboto" panose="02000000000000000000" pitchFamily="2" charset="0"/>
+                          <a:cs typeface="Roboto" panose="02000000000000000000" pitchFamily="2" charset="0"/>
+                        </a:rPr>
+                        <a:t>DevOps</a:t>
+                      </a:r>
+                      <a:r>
+                        <a:rPr lang="es-MX" sz="600" dirty="0">
+                          <a:latin typeface="Roboto" panose="02000000000000000000" pitchFamily="2" charset="0"/>
+                          <a:ea typeface="Roboto" panose="02000000000000000000" pitchFamily="2" charset="0"/>
+                          <a:cs typeface="Roboto" panose="02000000000000000000" pitchFamily="2" charset="0"/>
+                        </a:rPr>
+                        <a:t>: Es una práctica que une desarrollo (</a:t>
+                      </a:r>
+                      <a:r>
+                        <a:rPr lang="es-MX" sz="600" dirty="0" err="1">
+                          <a:latin typeface="Roboto" panose="02000000000000000000" pitchFamily="2" charset="0"/>
+                          <a:ea typeface="Roboto" panose="02000000000000000000" pitchFamily="2" charset="0"/>
+                          <a:cs typeface="Roboto" panose="02000000000000000000" pitchFamily="2" charset="0"/>
+                        </a:rPr>
+                        <a:t>Development</a:t>
+                      </a:r>
+                      <a:r>
+                        <a:rPr lang="es-MX" sz="600" dirty="0">
+                          <a:latin typeface="Roboto" panose="02000000000000000000" pitchFamily="2" charset="0"/>
+                          <a:ea typeface="Roboto" panose="02000000000000000000" pitchFamily="2" charset="0"/>
+                          <a:cs typeface="Roboto" panose="02000000000000000000" pitchFamily="2" charset="0"/>
+                        </a:rPr>
+                        <a:t>) y operaciones (</a:t>
+                      </a:r>
+                      <a:r>
+                        <a:rPr lang="es-MX" sz="600" dirty="0" err="1">
+                          <a:latin typeface="Roboto" panose="02000000000000000000" pitchFamily="2" charset="0"/>
+                          <a:ea typeface="Roboto" panose="02000000000000000000" pitchFamily="2" charset="0"/>
+                          <a:cs typeface="Roboto" panose="02000000000000000000" pitchFamily="2" charset="0"/>
+                        </a:rPr>
+                        <a:t>Operations</a:t>
+                      </a:r>
+                      <a:r>
+                        <a:rPr lang="es-MX" sz="600" dirty="0">
+                          <a:latin typeface="Roboto" panose="02000000000000000000" pitchFamily="2" charset="0"/>
+                          <a:ea typeface="Roboto" panose="02000000000000000000" pitchFamily="2" charset="0"/>
+                          <a:cs typeface="Roboto" panose="02000000000000000000" pitchFamily="2" charset="0"/>
+                        </a:rPr>
+                        <a:t>) para automatizar, estandarizar y mejorar el ciclo de vida del software, desde la codificación hasta el despliegue y monitoreo.</a:t>
+                      </a:r>
+                    </a:p>
+                    <a:p>
+                      <a:r>
+                        <a:rPr lang="es-MX" sz="600" b="1" dirty="0" err="1">
+                          <a:latin typeface="Roboto" panose="02000000000000000000" pitchFamily="2" charset="0"/>
+                          <a:ea typeface="Roboto" panose="02000000000000000000" pitchFamily="2" charset="0"/>
+                          <a:cs typeface="Roboto" panose="02000000000000000000" pitchFamily="2" charset="0"/>
+                        </a:rPr>
+                        <a:t>DataOps</a:t>
+                      </a:r>
+                      <a:r>
+                        <a:rPr lang="es-MX" sz="600" dirty="0">
+                          <a:latin typeface="Roboto" panose="02000000000000000000" pitchFamily="2" charset="0"/>
+                          <a:ea typeface="Roboto" panose="02000000000000000000" pitchFamily="2" charset="0"/>
+                          <a:cs typeface="Roboto" panose="02000000000000000000" pitchFamily="2" charset="0"/>
+                        </a:rPr>
+                        <a:t>: Es una práctica que aplica principios similares de agilidad y automatización al ciclo de vida de los datos, incluyendo la integración, calidad, transformación, análisis y entrega de datos para garantizar la disponibilidad y confiabilidad en los sistemas basados en datos.</a:t>
+                      </a:r>
+                    </a:p>
+                    <a:p>
+                      <a:pPr marL="0" lvl="0" indent="0" algn="l" rtl="0">
+                        <a:lnSpc>
+                          <a:spcPct val="115000"/>
+                        </a:lnSpc>
+                        <a:spcBef>
+                          <a:spcPts val="0"/>
+                        </a:spcBef>
+                        <a:spcAft>
+                          <a:spcPts val="0"/>
+                        </a:spcAft>
+                        <a:buNone/>
+                      </a:pPr>
+                      <a:endParaRPr sz="600" i="1" dirty="0">
+                        <a:solidFill>
+                          <a:srgbClr val="D9D9D9"/>
+                        </a:solidFill>
+                        <a:latin typeface="Roboto"/>
+                        <a:ea typeface="Roboto"/>
+                        <a:cs typeface="Roboto"/>
+                        <a:sym typeface="Roboto"/>
+                      </a:endParaRPr>
+                    </a:p>
+                  </a:txBody>
+                  <a:tcPr marL="63500" marR="63500" marT="63500" marB="63500">
+                    <a:lnL w="12700" cap="flat" cmpd="sng">
+                      <a:solidFill>
+                        <a:srgbClr val="38761D"/>
+                      </a:solidFill>
+                      <a:prstDash val="solid"/>
+                      <a:round/>
+                      <a:headEnd type="none" w="sm" len="sm"/>
+                      <a:tailEnd type="none" w="sm" len="sm"/>
+                    </a:lnL>
+                    <a:lnR w="12700" cap="flat" cmpd="sng">
+                      <a:solidFill>
+                        <a:srgbClr val="38761D"/>
+                      </a:solidFill>
+                      <a:prstDash val="solid"/>
+                      <a:round/>
+                      <a:headEnd type="none" w="sm" len="sm"/>
+                      <a:tailEnd type="none" w="sm" len="sm"/>
+                    </a:lnR>
+                    <a:lnT w="12700" cap="flat" cmpd="sng">
+                      <a:solidFill>
+                        <a:srgbClr val="38761D"/>
+                      </a:solidFill>
+                      <a:prstDash val="solid"/>
+                      <a:round/>
+                      <a:headEnd type="none" w="sm" len="sm"/>
+                      <a:tailEnd type="none" w="sm" len="sm"/>
+                    </a:lnT>
+                    <a:lnB w="12700" cap="flat" cmpd="sng">
+                      <a:solidFill>
+                        <a:srgbClr val="38761D"/>
+                      </a:solidFill>
+                      <a:prstDash val="solid"/>
+                      <a:round/>
+                      <a:headEnd type="none" w="sm" len="sm"/>
+                      <a:tailEnd type="none" w="sm" len="sm"/>
+                    </a:lnB>
+                  </a:tcPr>
+                </a:tc>
+                <a:extLst>
+                  <a:ext uri="{0D108BD9-81ED-4DB2-BD59-A6C34878D82A}">
+                    <a16:rowId xmlns:a16="http://schemas.microsoft.com/office/drawing/2014/main" val="10006"/>
+                  </a:ext>
+                </a:extLst>
+              </a:tr>
+              <a:tr h="740188">
+                <a:tc>
+                  <a:txBody>
+                    <a:bodyPr/>
+                    <a:lstStyle/>
+                    <a:p>
+                      <a:pPr marL="0" lvl="0" indent="0" algn="ctr" rtl="0">
+                        <a:lnSpc>
+                          <a:spcPct val="115000"/>
+                        </a:lnSpc>
+                        <a:spcBef>
+                          <a:spcPts val="0"/>
+                        </a:spcBef>
+                        <a:spcAft>
+                          <a:spcPts val="0"/>
+                        </a:spcAft>
+                        <a:buNone/>
+                      </a:pPr>
+                      <a:r>
                         <a:rPr lang="en" sz="1300" b="1">
                           <a:solidFill>
                             <a:srgbClr val="274E13"/>
@@ -11716,7 +12316,7 @@
                           <a:cs typeface="Roboto"/>
                           <a:sym typeface="Roboto"/>
                         </a:rPr>
-                        <a:t>CI/CD basico</a:t>
+                        <a:t>Servidores y computación en la nube para data</a:t>
                       </a:r>
                       <a:endParaRPr sz="1300" b="1">
                         <a:solidFill>
@@ -11792,7 +12392,7 @@
                           <a:cs typeface="Roboto"/>
                           <a:sym typeface="Roboto"/>
                         </a:rPr>
-                        <a:t>DataOps vs. DevOps</a:t>
+                        <a:t>Data en cloud</a:t>
                       </a:r>
                       <a:endParaRPr sz="1000" b="1">
                         <a:latin typeface="Roboto"/>
@@ -11870,7 +12470,7 @@
                           <a:cs typeface="Roboto"/>
                           <a:sym typeface="Roboto"/>
                         </a:rPr>
-                        <a:t>Investiga el límite entre ambas.</a:t>
+                        <a:t>Investiga qué productos de data ofrece cada proveedor.</a:t>
                       </a:r>
                       <a:endParaRPr sz="1000">
                         <a:latin typeface="Roboto"/>
@@ -11924,329 +12524,171 @@
                     <a:bodyPr/>
                     <a:lstStyle/>
                     <a:p>
-                      <a:pPr marL="0" lvl="0" indent="0" algn="l" rtl="0">
-                        <a:lnSpc>
-                          <a:spcPct val="115000"/>
-                        </a:lnSpc>
-                        <a:spcBef>
-                          <a:spcPts val="0"/>
-                        </a:spcBef>
-                        <a:spcAft>
-                          <a:spcPts val="0"/>
-                        </a:spcAft>
-                        <a:buNone/>
-                      </a:pPr>
-                      <a:endParaRPr sz="1100" i="1">
+                      <a:pPr marL="0" lvl="0" indent="0" algn="just" rtl="0">
+                        <a:lnSpc>
+                          <a:spcPct val="115000"/>
+                        </a:lnSpc>
+                        <a:spcBef>
+                          <a:spcPts val="0"/>
+                        </a:spcBef>
+                        <a:spcAft>
+                          <a:spcPts val="0"/>
+                        </a:spcAft>
+                        <a:buNone/>
+                      </a:pPr>
+                      <a:r>
+                        <a:rPr lang="es-ES" sz="900" i="0" dirty="0">
+                          <a:solidFill>
+                            <a:schemeClr val="tx1"/>
+                          </a:solidFill>
+                          <a:latin typeface="Roboto" panose="02000000000000000000" pitchFamily="2" charset="0"/>
+                          <a:ea typeface="Roboto" panose="02000000000000000000" pitchFamily="2" charset="0"/>
+                          <a:cs typeface="Roboto" panose="02000000000000000000" pitchFamily="2" charset="0"/>
+                          <a:sym typeface="Roboto"/>
+                        </a:rPr>
+                        <a:t>Azure: </a:t>
+                      </a:r>
+                      <a:r>
+                        <a:rPr lang="it-IT" sz="900" i="0" dirty="0">
+                          <a:solidFill>
+                            <a:schemeClr val="tx1"/>
+                          </a:solidFill>
+                          <a:latin typeface="Roboto" panose="02000000000000000000" pitchFamily="2" charset="0"/>
+                          <a:ea typeface="Roboto" panose="02000000000000000000" pitchFamily="2" charset="0"/>
+                          <a:cs typeface="Roboto" panose="02000000000000000000" pitchFamily="2" charset="0"/>
+                          <a:sym typeface="Roboto"/>
+                        </a:rPr>
+                        <a:t>	Azure Blob Storage, Azure Data Lake</a:t>
+                      </a:r>
+                      <a:endParaRPr lang="es-ES" sz="900" i="0" dirty="0">
+                        <a:solidFill>
+                          <a:schemeClr val="tx1"/>
+                        </a:solidFill>
+                        <a:latin typeface="Roboto" panose="02000000000000000000" pitchFamily="2" charset="0"/>
+                        <a:ea typeface="Roboto" panose="02000000000000000000" pitchFamily="2" charset="0"/>
+                        <a:cs typeface="Roboto" panose="02000000000000000000" pitchFamily="2" charset="0"/>
+                        <a:sym typeface="Roboto"/>
+                      </a:endParaRPr>
+                    </a:p>
+                    <a:p>
+                      <a:pPr marL="0" lvl="0" indent="0" algn="just" rtl="0">
+                        <a:lnSpc>
+                          <a:spcPct val="115000"/>
+                        </a:lnSpc>
+                        <a:spcBef>
+                          <a:spcPts val="0"/>
+                        </a:spcBef>
+                        <a:spcAft>
+                          <a:spcPts val="0"/>
+                        </a:spcAft>
+                        <a:buNone/>
+                      </a:pPr>
+                      <a:r>
+                        <a:rPr lang="es-ES" sz="900" i="0" dirty="0">
+                          <a:solidFill>
+                            <a:schemeClr val="tx1"/>
+                          </a:solidFill>
+                          <a:latin typeface="Roboto" panose="02000000000000000000" pitchFamily="2" charset="0"/>
+                          <a:ea typeface="Roboto" panose="02000000000000000000" pitchFamily="2" charset="0"/>
+                          <a:cs typeface="Roboto" panose="02000000000000000000" pitchFamily="2" charset="0"/>
+                          <a:sym typeface="Roboto"/>
+                        </a:rPr>
+                        <a:t>AWS: Amazon S3, Amazon </a:t>
+                      </a:r>
+                      <a:r>
+                        <a:rPr lang="es-ES" sz="900" i="0" dirty="0" err="1">
+                          <a:solidFill>
+                            <a:schemeClr val="tx1"/>
+                          </a:solidFill>
+                          <a:latin typeface="Roboto" panose="02000000000000000000" pitchFamily="2" charset="0"/>
+                          <a:ea typeface="Roboto" panose="02000000000000000000" pitchFamily="2" charset="0"/>
+                          <a:cs typeface="Roboto" panose="02000000000000000000" pitchFamily="2" charset="0"/>
+                          <a:sym typeface="Roboto"/>
+                        </a:rPr>
+                        <a:t>Redshift</a:t>
+                      </a:r>
+                      <a:endParaRPr lang="es-ES" sz="900" i="0" dirty="0">
+                        <a:solidFill>
+                          <a:schemeClr val="tx1"/>
+                        </a:solidFill>
+                        <a:latin typeface="Roboto" panose="02000000000000000000" pitchFamily="2" charset="0"/>
+                        <a:ea typeface="Roboto" panose="02000000000000000000" pitchFamily="2" charset="0"/>
+                        <a:cs typeface="Roboto" panose="02000000000000000000" pitchFamily="2" charset="0"/>
+                        <a:sym typeface="Roboto"/>
+                      </a:endParaRPr>
+                    </a:p>
+                    <a:p>
+                      <a:pPr marL="0" lvl="0" indent="0" algn="just" rtl="0">
+                        <a:lnSpc>
+                          <a:spcPct val="115000"/>
+                        </a:lnSpc>
+                        <a:spcBef>
+                          <a:spcPts val="0"/>
+                        </a:spcBef>
+                        <a:spcAft>
+                          <a:spcPts val="0"/>
+                        </a:spcAft>
+                        <a:buNone/>
+                      </a:pPr>
+                      <a:r>
+                        <a:rPr lang="es-ES" sz="900" i="0" dirty="0">
+                          <a:solidFill>
+                            <a:schemeClr val="tx1"/>
+                          </a:solidFill>
+                          <a:latin typeface="Roboto" panose="02000000000000000000" pitchFamily="2" charset="0"/>
+                          <a:ea typeface="Roboto" panose="02000000000000000000" pitchFamily="2" charset="0"/>
+                          <a:cs typeface="Roboto" panose="02000000000000000000" pitchFamily="2" charset="0"/>
+                          <a:sym typeface="Roboto"/>
+                        </a:rPr>
+                        <a:t>Google </a:t>
+                      </a:r>
+                      <a:r>
+                        <a:rPr lang="es-ES" sz="900" i="0" dirty="0" err="1">
+                          <a:solidFill>
+                            <a:schemeClr val="tx1"/>
+                          </a:solidFill>
+                          <a:latin typeface="Roboto" panose="02000000000000000000" pitchFamily="2" charset="0"/>
+                          <a:ea typeface="Roboto" panose="02000000000000000000" pitchFamily="2" charset="0"/>
+                          <a:cs typeface="Roboto" panose="02000000000000000000" pitchFamily="2" charset="0"/>
+                          <a:sym typeface="Roboto"/>
+                        </a:rPr>
+                        <a:t>Clould</a:t>
+                      </a:r>
+                      <a:r>
+                        <a:rPr lang="es-ES" sz="900" i="1" dirty="0">
+                          <a:solidFill>
+                            <a:srgbClr val="D9D9D9"/>
+                          </a:solidFill>
+                          <a:latin typeface="Roboto" panose="02000000000000000000" pitchFamily="2" charset="0"/>
+                          <a:ea typeface="Roboto" panose="02000000000000000000" pitchFamily="2" charset="0"/>
+                          <a:cs typeface="Roboto" panose="02000000000000000000" pitchFamily="2" charset="0"/>
+                          <a:sym typeface="Roboto"/>
+                        </a:rPr>
+                        <a:t>:</a:t>
+                      </a:r>
+                      <a:r>
+                        <a:rPr lang="es-CO" sz="900" dirty="0">
+                          <a:latin typeface="Roboto" panose="02000000000000000000" pitchFamily="2" charset="0"/>
+                          <a:ea typeface="Roboto" panose="02000000000000000000" pitchFamily="2" charset="0"/>
+                          <a:cs typeface="Roboto" panose="02000000000000000000" pitchFamily="2" charset="0"/>
+                        </a:rPr>
+                        <a:t>Google Cloud Storage, </a:t>
+                      </a:r>
+                      <a:r>
+                        <a:rPr lang="es-CO" sz="900" dirty="0" err="1">
+                          <a:latin typeface="Roboto" panose="02000000000000000000" pitchFamily="2" charset="0"/>
+                          <a:ea typeface="Roboto" panose="02000000000000000000" pitchFamily="2" charset="0"/>
+                          <a:cs typeface="Roboto" panose="02000000000000000000" pitchFamily="2" charset="0"/>
+                        </a:rPr>
+                        <a:t>BigQuery</a:t>
+                      </a:r>
+                      <a:endParaRPr sz="900" i="1" dirty="0">
                         <a:solidFill>
                           <a:srgbClr val="D9D9D9"/>
                         </a:solidFill>
-                        <a:latin typeface="Roboto"/>
-                        <a:ea typeface="Roboto"/>
-                        <a:cs typeface="Roboto"/>
-                        <a:sym typeface="Roboto"/>
-                      </a:endParaRPr>
-                    </a:p>
-                  </a:txBody>
-                  <a:tcPr marL="63500" marR="63500" marT="63500" marB="63500">
-                    <a:lnL w="12700" cap="flat" cmpd="sng">
-                      <a:solidFill>
-                        <a:srgbClr val="38761D"/>
-                      </a:solidFill>
-                      <a:prstDash val="solid"/>
-                      <a:round/>
-                      <a:headEnd type="none" w="sm" len="sm"/>
-                      <a:tailEnd type="none" w="sm" len="sm"/>
-                    </a:lnL>
-                    <a:lnR w="12700" cap="flat" cmpd="sng">
-                      <a:solidFill>
-                        <a:srgbClr val="38761D"/>
-                      </a:solidFill>
-                      <a:prstDash val="solid"/>
-                      <a:round/>
-                      <a:headEnd type="none" w="sm" len="sm"/>
-                      <a:tailEnd type="none" w="sm" len="sm"/>
-                    </a:lnR>
-                    <a:lnT w="12700" cap="flat" cmpd="sng">
-                      <a:solidFill>
-                        <a:srgbClr val="38761D"/>
-                      </a:solidFill>
-                      <a:prstDash val="solid"/>
-                      <a:round/>
-                      <a:headEnd type="none" w="sm" len="sm"/>
-                      <a:tailEnd type="none" w="sm" len="sm"/>
-                    </a:lnT>
-                    <a:lnB w="12700" cap="flat" cmpd="sng">
-                      <a:solidFill>
-                        <a:srgbClr val="38761D"/>
-                      </a:solidFill>
-                      <a:prstDash val="solid"/>
-                      <a:round/>
-                      <a:headEnd type="none" w="sm" len="sm"/>
-                      <a:tailEnd type="none" w="sm" len="sm"/>
-                    </a:lnB>
-                  </a:tcPr>
-                </a:tc>
-                <a:extLst>
-                  <a:ext uri="{0D108BD9-81ED-4DB2-BD59-A6C34878D82A}">
-                    <a16:rowId xmlns:a16="http://schemas.microsoft.com/office/drawing/2014/main" val="10006"/>
-                  </a:ext>
-                </a:extLst>
-              </a:tr>
-              <a:tr h="822700">
-                <a:tc>
-                  <a:txBody>
-                    <a:bodyPr/>
-                    <a:lstStyle/>
-                    <a:p>
-                      <a:pPr marL="0" lvl="0" indent="0" algn="ctr" rtl="0">
-                        <a:lnSpc>
-                          <a:spcPct val="115000"/>
-                        </a:lnSpc>
-                        <a:spcBef>
-                          <a:spcPts val="0"/>
-                        </a:spcBef>
-                        <a:spcAft>
-                          <a:spcPts val="0"/>
-                        </a:spcAft>
-                        <a:buNone/>
-                      </a:pPr>
-                      <a:r>
-                        <a:rPr lang="en" sz="1300" b="1">
-                          <a:solidFill>
-                            <a:srgbClr val="274E13"/>
-                          </a:solidFill>
-                          <a:latin typeface="Roboto"/>
-                          <a:ea typeface="Roboto"/>
-                          <a:cs typeface="Roboto"/>
-                          <a:sym typeface="Roboto"/>
-                        </a:rPr>
-                        <a:t>Servidores y computación en la nube para data</a:t>
-                      </a:r>
-                      <a:endParaRPr sz="1300" b="1">
-                        <a:solidFill>
-                          <a:srgbClr val="274E13"/>
-                        </a:solidFill>
-                        <a:latin typeface="Roboto"/>
-                        <a:ea typeface="Roboto"/>
-                        <a:cs typeface="Roboto"/>
-                        <a:sym typeface="Roboto"/>
-                      </a:endParaRPr>
-                    </a:p>
-                  </a:txBody>
-                  <a:tcPr marL="63500" marR="63500" marT="63500" marB="63500" anchor="ctr">
-                    <a:lnL w="12700" cap="flat" cmpd="sng">
-                      <a:solidFill>
-                        <a:srgbClr val="38761D"/>
-                      </a:solidFill>
-                      <a:prstDash val="solid"/>
-                      <a:round/>
-                      <a:headEnd type="none" w="sm" len="sm"/>
-                      <a:tailEnd type="none" w="sm" len="sm"/>
-                    </a:lnL>
-                    <a:lnR w="12700" cap="flat" cmpd="sng">
-                      <a:solidFill>
-                        <a:srgbClr val="38761D"/>
-                      </a:solidFill>
-                      <a:prstDash val="solid"/>
-                      <a:round/>
-                      <a:headEnd type="none" w="sm" len="sm"/>
-                      <a:tailEnd type="none" w="sm" len="sm"/>
-                    </a:lnR>
-                    <a:lnT w="12700" cap="flat" cmpd="sng">
-                      <a:solidFill>
-                        <a:srgbClr val="38761D"/>
-                      </a:solidFill>
-                      <a:prstDash val="solid"/>
-                      <a:round/>
-                      <a:headEnd type="none" w="sm" len="sm"/>
-                      <a:tailEnd type="none" w="sm" len="sm"/>
-                    </a:lnT>
-                    <a:lnB w="12700" cap="flat" cmpd="sng">
-                      <a:solidFill>
-                        <a:srgbClr val="38761D"/>
-                      </a:solidFill>
-                      <a:prstDash val="solid"/>
-                      <a:round/>
-                      <a:headEnd type="none" w="sm" len="sm"/>
-                      <a:tailEnd type="none" w="sm" len="sm"/>
-                    </a:lnB>
-                  </a:tcPr>
-                </a:tc>
-                <a:tc>
-                  <a:txBody>
-                    <a:bodyPr/>
-                    <a:lstStyle/>
-                    <a:p>
-                      <a:pPr marL="0" lvl="0" indent="0" algn="l" rtl="0">
-                        <a:lnSpc>
-                          <a:spcPct val="115000"/>
-                        </a:lnSpc>
-                        <a:spcBef>
-                          <a:spcPts val="0"/>
-                        </a:spcBef>
-                        <a:spcAft>
-                          <a:spcPts val="0"/>
-                        </a:spcAft>
-                        <a:buNone/>
-                      </a:pPr>
-                      <a:r>
-                        <a:rPr lang="en" sz="1000" b="1">
-                          <a:latin typeface="Roboto"/>
-                          <a:ea typeface="Roboto"/>
-                          <a:cs typeface="Roboto"/>
-                          <a:sym typeface="Roboto"/>
-                        </a:rPr>
-                        <a:t>Data en cloud</a:t>
-                      </a:r>
-                      <a:endParaRPr sz="1000" b="1">
-                        <a:latin typeface="Roboto"/>
-                        <a:ea typeface="Roboto"/>
-                        <a:cs typeface="Roboto"/>
-                        <a:sym typeface="Roboto"/>
-                      </a:endParaRPr>
-                    </a:p>
-                    <a:p>
-                      <a:pPr marL="0" lvl="0" indent="0" algn="l" rtl="0">
-                        <a:lnSpc>
-                          <a:spcPct val="115000"/>
-                        </a:lnSpc>
-                        <a:spcBef>
-                          <a:spcPts val="0"/>
-                        </a:spcBef>
-                        <a:spcAft>
-                          <a:spcPts val="0"/>
-                        </a:spcAft>
-                        <a:buNone/>
-                      </a:pPr>
-                      <a:endParaRPr sz="1000" b="1">
-                        <a:latin typeface="Roboto"/>
-                        <a:ea typeface="Roboto"/>
-                        <a:cs typeface="Roboto"/>
-                        <a:sym typeface="Roboto"/>
-                      </a:endParaRPr>
-                    </a:p>
-                    <a:p>
-                      <a:pPr marL="0" lvl="0" indent="0" algn="l" rtl="0">
-                        <a:lnSpc>
-                          <a:spcPct val="115000"/>
-                        </a:lnSpc>
-                        <a:spcBef>
-                          <a:spcPts val="0"/>
-                        </a:spcBef>
-                        <a:spcAft>
-                          <a:spcPts val="0"/>
-                        </a:spcAft>
-                        <a:buNone/>
-                      </a:pPr>
-                      <a:r>
-                        <a:rPr lang="en" sz="1000">
-                          <a:latin typeface="Roboto"/>
-                          <a:ea typeface="Roboto"/>
-                          <a:cs typeface="Roboto"/>
-                          <a:sym typeface="Roboto"/>
-                        </a:rPr>
-                        <a:t>Instrucciones:</a:t>
-                      </a:r>
-                      <a:endParaRPr sz="1000">
-                        <a:latin typeface="Roboto"/>
-                        <a:ea typeface="Roboto"/>
-                        <a:cs typeface="Roboto"/>
-                        <a:sym typeface="Roboto"/>
-                      </a:endParaRPr>
-                    </a:p>
-                    <a:p>
-                      <a:pPr marL="0" lvl="0" indent="0" algn="l" rtl="0">
-                        <a:lnSpc>
-                          <a:spcPct val="115000"/>
-                        </a:lnSpc>
-                        <a:spcBef>
-                          <a:spcPts val="0"/>
-                        </a:spcBef>
-                        <a:spcAft>
-                          <a:spcPts val="0"/>
-                        </a:spcAft>
-                        <a:buNone/>
-                      </a:pPr>
-                      <a:r>
-                        <a:rPr lang="en" sz="1000">
-                          <a:latin typeface="Roboto"/>
-                          <a:ea typeface="Roboto"/>
-                          <a:cs typeface="Roboto"/>
-                          <a:sym typeface="Roboto"/>
-                        </a:rPr>
-                        <a:t>Investiga qué productos de data ofrece cada proveedor.</a:t>
-                      </a:r>
-                      <a:endParaRPr sz="1000">
-                        <a:latin typeface="Roboto"/>
-                        <a:ea typeface="Roboto"/>
-                        <a:cs typeface="Roboto"/>
-                        <a:sym typeface="Roboto"/>
-                      </a:endParaRPr>
-                    </a:p>
-                  </a:txBody>
-                  <a:tcPr marL="63500" marR="63500" marT="63500" marB="63500">
-                    <a:lnL w="12700" cap="flat" cmpd="sng">
-                      <a:solidFill>
-                        <a:srgbClr val="38761D"/>
-                      </a:solidFill>
-                      <a:prstDash val="solid"/>
-                      <a:round/>
-                      <a:headEnd type="none" w="sm" len="sm"/>
-                      <a:tailEnd type="none" w="sm" len="sm"/>
-                    </a:lnL>
-                    <a:lnR w="12700" cap="flat" cmpd="sng">
-                      <a:solidFill>
-                        <a:srgbClr val="38761D"/>
-                      </a:solidFill>
-                      <a:prstDash val="solid"/>
-                      <a:round/>
-                      <a:headEnd type="none" w="sm" len="sm"/>
-                      <a:tailEnd type="none" w="sm" len="sm"/>
-                    </a:lnR>
-                    <a:lnT w="12700" cap="flat" cmpd="sng">
-                      <a:solidFill>
-                        <a:srgbClr val="38761D"/>
-                      </a:solidFill>
-                      <a:prstDash val="solid"/>
-                      <a:round/>
-                      <a:headEnd type="none" w="sm" len="sm"/>
-                      <a:tailEnd type="none" w="sm" len="sm"/>
-                    </a:lnT>
-                    <a:lnB w="12700" cap="flat" cmpd="sng">
-                      <a:solidFill>
-                        <a:srgbClr val="38761D"/>
-                      </a:solidFill>
-                      <a:prstDash val="solid"/>
-                      <a:round/>
-                      <a:headEnd type="none" w="sm" len="sm"/>
-                      <a:tailEnd type="none" w="sm" len="sm"/>
-                    </a:lnB>
-                  </a:tcPr>
-                </a:tc>
-                <a:tc>
-                  <a:txBody>
-                    <a:bodyPr/>
-                    <a:lstStyle/>
-                    <a:p>
-                      <a:pPr marL="0" lvl="0" indent="0" algn="l" rtl="0">
-                        <a:lnSpc>
-                          <a:spcPct val="115000"/>
-                        </a:lnSpc>
-                        <a:spcBef>
-                          <a:spcPts val="0"/>
-                        </a:spcBef>
-                        <a:spcAft>
-                          <a:spcPts val="0"/>
-                        </a:spcAft>
-                        <a:buNone/>
-                      </a:pPr>
-                      <a:endParaRPr sz="1100" i="1" dirty="0">
-                        <a:solidFill>
-                          <a:srgbClr val="D9D9D9"/>
-                        </a:solidFill>
-                        <a:latin typeface="Roboto"/>
-                        <a:ea typeface="Roboto"/>
-                        <a:cs typeface="Roboto"/>
+                        <a:latin typeface="Roboto" panose="02000000000000000000" pitchFamily="2" charset="0"/>
+                        <a:ea typeface="Roboto" panose="02000000000000000000" pitchFamily="2" charset="0"/>
+                        <a:cs typeface="Roboto" panose="02000000000000000000" pitchFamily="2" charset="0"/>
                         <a:sym typeface="Roboto"/>
                       </a:endParaRPr>
                     </a:p>
@@ -12418,7 +12860,13 @@
         <p:nvGraphicFramePr>
           <p:cNvPr id="60" name="Google Shape;60;p8"/>
           <p:cNvGraphicFramePr/>
-          <p:nvPr/>
+          <p:nvPr>
+            <p:extLst>
+              <p:ext uri="{D42A27DB-BD31-4B8C-83A1-F6EECF244321}">
+                <p14:modId xmlns:p14="http://schemas.microsoft.com/office/powerpoint/2010/main" val="1241721753"/>
+              </p:ext>
+            </p:extLst>
+          </p:nvPr>
         </p:nvGraphicFramePr>
         <p:xfrm>
           <a:off x="497100" y="1162050"/>
@@ -13023,24 +13471,25 @@
                         <a:buNone/>
                       </a:pPr>
                       <a:r>
-                        <a:rPr lang="en" sz="1100" i="1">
+                        <a:rPr lang="en-US" sz="1000" b="0" i="0" u="none" strike="noStrike" cap="none" dirty="0">
                           <a:solidFill>
-                            <a:srgbClr val="CCCCCC"/>
+                            <a:srgbClr val="000000"/>
                           </a:solidFill>
-                          <a:latin typeface="Roboto"/>
-                          <a:ea typeface="Roboto"/>
-                          <a:cs typeface="Roboto"/>
-                          <a:sym typeface="Roboto"/>
-                        </a:rPr>
-                        <a:t>Escribe aquí tus respuestas.</a:t>
-                      </a:r>
-                      <a:endParaRPr sz="1100" i="1">
+                          <a:effectLst/>
+                          <a:latin typeface="Roboto" panose="02000000000000000000" pitchFamily="2" charset="0"/>
+                          <a:ea typeface="Roboto" panose="02000000000000000000" pitchFamily="2" charset="0"/>
+                          <a:cs typeface="Roboto" panose="02000000000000000000" pitchFamily="2" charset="0"/>
+                          <a:sym typeface="Arial"/>
+                        </a:rPr>
+                        <a:t>Deep Learning • Machine Vision • Supervised Learning • Human Machine Interface • Evolutionary Algorithms</a:t>
+                      </a:r>
+                      <a:endParaRPr sz="1000" i="0" dirty="0">
                         <a:solidFill>
-                          <a:srgbClr val="CCCCCC"/>
+                          <a:schemeClr val="tx1"/>
                         </a:solidFill>
-                        <a:latin typeface="Roboto"/>
-                        <a:ea typeface="Roboto"/>
-                        <a:cs typeface="Roboto"/>
+                        <a:latin typeface="Roboto" panose="02000000000000000000" pitchFamily="2" charset="0"/>
+                        <a:ea typeface="Roboto" panose="02000000000000000000" pitchFamily="2" charset="0"/>
+                        <a:cs typeface="Roboto" panose="02000000000000000000" pitchFamily="2" charset="0"/>
                         <a:sym typeface="Roboto"/>
                       </a:endParaRPr>
                     </a:p>
@@ -13338,13 +13787,95 @@
                         </a:spcAft>
                         <a:buNone/>
                       </a:pPr>
-                      <a:endParaRPr sz="1100" i="1">
+                      <a:r>
+                        <a:rPr lang="es-MX" sz="1100" dirty="0">
+                          <a:latin typeface="Roboto" panose="02000000000000000000" pitchFamily="2" charset="0"/>
+                          <a:ea typeface="Roboto" panose="02000000000000000000" pitchFamily="2" charset="0"/>
+                          <a:cs typeface="Roboto" panose="02000000000000000000" pitchFamily="2" charset="0"/>
+                        </a:rPr>
+                        <a:t>Incidente del Facebook 2018 (Fallos en la seguridad)</a:t>
+                      </a:r>
+                    </a:p>
+                    <a:p>
+                      <a:pPr marL="0" lvl="0" indent="0" algn="l" rtl="0">
+                        <a:lnSpc>
+                          <a:spcPct val="115000"/>
+                        </a:lnSpc>
+                        <a:spcBef>
+                          <a:spcPts val="0"/>
+                        </a:spcBef>
+                        <a:spcAft>
+                          <a:spcPts val="0"/>
+                        </a:spcAft>
+                        <a:buNone/>
+                      </a:pPr>
+                      <a:r>
+                        <a:rPr lang="pt-BR" sz="1100" dirty="0">
+                          <a:latin typeface="Roboto" panose="02000000000000000000" pitchFamily="2" charset="0"/>
+                          <a:ea typeface="Roboto" panose="02000000000000000000" pitchFamily="2" charset="0"/>
+                          <a:cs typeface="Roboto" panose="02000000000000000000" pitchFamily="2" charset="0"/>
+                        </a:rPr>
+                        <a:t>Incidente de AWS S3 (2017)</a:t>
+                      </a:r>
+                    </a:p>
+                    <a:p>
+                      <a:pPr marL="0" lvl="0" indent="0" algn="l" rtl="0">
+                        <a:lnSpc>
+                          <a:spcPct val="115000"/>
+                        </a:lnSpc>
+                        <a:spcBef>
+                          <a:spcPts val="0"/>
+                        </a:spcBef>
+                        <a:spcAft>
+                          <a:spcPts val="0"/>
+                        </a:spcAft>
+                        <a:buNone/>
+                      </a:pPr>
+                      <a:r>
+                        <a:rPr lang="es-CO" sz="1100" dirty="0" err="1">
+                          <a:latin typeface="Roboto" panose="02000000000000000000" pitchFamily="2" charset="0"/>
+                          <a:ea typeface="Roboto" panose="02000000000000000000" pitchFamily="2" charset="0"/>
+                          <a:cs typeface="Roboto" panose="02000000000000000000" pitchFamily="2" charset="0"/>
+                        </a:rPr>
+                        <a:t>Downtime</a:t>
+                      </a:r>
+                      <a:r>
+                        <a:rPr lang="es-CO" sz="1100" dirty="0">
+                          <a:latin typeface="Roboto" panose="02000000000000000000" pitchFamily="2" charset="0"/>
+                          <a:ea typeface="Roboto" panose="02000000000000000000" pitchFamily="2" charset="0"/>
+                          <a:cs typeface="Roboto" panose="02000000000000000000" pitchFamily="2" charset="0"/>
+                        </a:rPr>
+                        <a:t> de AWS (2017)</a:t>
+                      </a:r>
+                    </a:p>
+                    <a:p>
+                      <a:pPr marL="0" lvl="0" indent="0" algn="l" rtl="0">
+                        <a:lnSpc>
+                          <a:spcPct val="115000"/>
+                        </a:lnSpc>
+                        <a:spcBef>
+                          <a:spcPts val="0"/>
+                        </a:spcBef>
+                        <a:spcAft>
+                          <a:spcPts val="0"/>
+                        </a:spcAft>
+                        <a:buNone/>
+                      </a:pPr>
+                      <a:r>
+                        <a:rPr lang="es-CO" sz="1100" dirty="0">
+                          <a:latin typeface="Roboto" panose="02000000000000000000" pitchFamily="2" charset="0"/>
+                          <a:ea typeface="Roboto" panose="02000000000000000000" pitchFamily="2" charset="0"/>
+                          <a:cs typeface="Roboto" panose="02000000000000000000" pitchFamily="2" charset="0"/>
+                        </a:rPr>
+                        <a:t>Rotura del sistema bancario en Brasil (2018)</a:t>
+                      </a:r>
+                      <a:endParaRPr sz="1100" i="1" dirty="0">
                         <a:solidFill>
                           <a:srgbClr val="D9D9D9"/>
                         </a:solidFill>
-                        <a:latin typeface="Roboto"/>
-                        <a:ea typeface="Roboto"/>
-                        <a:cs typeface="Roboto"/>
+                        <a:latin typeface="Roboto" panose="02000000000000000000" pitchFamily="2" charset="0"/>
+                        <a:ea typeface="Roboto" panose="02000000000000000000" pitchFamily="2" charset="0"/>
+                        <a:cs typeface="Roboto" panose="02000000000000000000" pitchFamily="2" charset="0"/>
                         <a:sym typeface="Roboto"/>
                       </a:endParaRPr>
                     </a:p>
@@ -13402,11 +13933,17 @@
         <p:nvGraphicFramePr>
           <p:cNvPr id="61" name="Google Shape;61;p8"/>
           <p:cNvGraphicFramePr/>
-          <p:nvPr/>
+          <p:nvPr>
+            <p:extLst>
+              <p:ext uri="{D42A27DB-BD31-4B8C-83A1-F6EECF244321}">
+                <p14:modId xmlns:p14="http://schemas.microsoft.com/office/powerpoint/2010/main" val="392598519"/>
+              </p:ext>
+            </p:extLst>
+          </p:nvPr>
         </p:nvGraphicFramePr>
         <p:xfrm>
           <a:off x="497100" y="5029200"/>
-          <a:ext cx="6778175" cy="3906470"/>
+          <a:ext cx="6778175" cy="3986982"/>
         </p:xfrm>
         <a:graphic>
           <a:graphicData uri="http://schemas.openxmlformats.org/drawingml/2006/table">
@@ -13856,7 +14393,7 @@
                         <a:buNone/>
                       </a:pPr>
                       <a:r>
-                        <a:rPr lang="en" sz="1000" b="1">
+                        <a:rPr lang="en" sz="1000" b="1" dirty="0">
                           <a:latin typeface="Roboto"/>
                           <a:ea typeface="Roboto"/>
                           <a:cs typeface="Roboto"/>
@@ -13864,7 +14401,7 @@
                         </a:rPr>
                         <a:t>Networking</a:t>
                       </a:r>
-                      <a:endParaRPr sz="1000" b="1">
+                      <a:endParaRPr sz="1000" b="1" dirty="0">
                         <a:latin typeface="Roboto"/>
                         <a:ea typeface="Roboto"/>
                         <a:cs typeface="Roboto"/>
@@ -13884,7 +14421,7 @@
                         </a:spcAft>
                         <a:buNone/>
                       </a:pPr>
-                      <a:endParaRPr sz="1000" b="1">
+                      <a:endParaRPr sz="1000" b="1" dirty="0">
                         <a:latin typeface="Roboto"/>
                         <a:ea typeface="Roboto"/>
                         <a:cs typeface="Roboto"/>
@@ -13905,7 +14442,7 @@
                         <a:buNone/>
                       </a:pPr>
                       <a:r>
-                        <a:rPr lang="en" sz="1000">
+                        <a:rPr lang="en" sz="1000" dirty="0">
                           <a:latin typeface="Roboto"/>
                           <a:ea typeface="Roboto"/>
                           <a:cs typeface="Roboto"/>
@@ -13913,7 +14450,7 @@
                         </a:rPr>
                         <a:t>Instrucciones:</a:t>
                       </a:r>
-                      <a:endParaRPr sz="1000">
+                      <a:endParaRPr sz="1000" dirty="0">
                         <a:latin typeface="Roboto"/>
                         <a:ea typeface="Roboto"/>
                         <a:cs typeface="Roboto"/>
@@ -13934,7 +14471,7 @@
                         <a:buNone/>
                       </a:pPr>
                       <a:r>
-                        <a:rPr lang="en" sz="1000">
+                        <a:rPr lang="en" sz="1000" dirty="0">
                           <a:latin typeface="Roboto"/>
                           <a:ea typeface="Roboto"/>
                           <a:cs typeface="Roboto"/>
@@ -13942,7 +14479,7 @@
                         </a:rPr>
                         <a:t>- Crea tu LinkedIn</a:t>
                       </a:r>
-                      <a:endParaRPr sz="1000">
+                      <a:endParaRPr sz="1000" dirty="0">
                         <a:latin typeface="Roboto"/>
                         <a:ea typeface="Roboto"/>
                         <a:cs typeface="Roboto"/>
@@ -13963,7 +14500,7 @@
                         <a:buNone/>
                       </a:pPr>
                       <a:r>
-                        <a:rPr lang="en" sz="1000">
+                        <a:rPr lang="en" sz="1000" dirty="0">
                           <a:latin typeface="Roboto"/>
                           <a:ea typeface="Roboto"/>
                           <a:cs typeface="Roboto"/>
@@ -13971,7 +14508,7 @@
                         </a:rPr>
                         <a:t>- Participa en un evento</a:t>
                       </a:r>
-                      <a:endParaRPr sz="1000">
+                      <a:endParaRPr sz="1000" dirty="0">
                         <a:latin typeface="Roboto"/>
                         <a:ea typeface="Roboto"/>
                         <a:cs typeface="Roboto"/>
@@ -14036,20 +14573,20 @@
                         <a:buNone/>
                       </a:pPr>
                       <a:r>
-                        <a:rPr lang="en" sz="1100" i="1">
+                        <a:rPr lang="es-CO" sz="1100" i="0" dirty="0">
                           <a:solidFill>
-                            <a:srgbClr val="CCCCCC"/>
+                            <a:schemeClr val="tx1"/>
                           </a:solidFill>
                           <a:latin typeface="Roboto"/>
                           <a:ea typeface="Roboto"/>
                           <a:cs typeface="Roboto"/>
                           <a:sym typeface="Roboto"/>
                         </a:rPr>
-                        <a:t>Escribe aquí tus respuestas.</a:t>
-                      </a:r>
-                      <a:endParaRPr sz="1100" i="1">
+                        <a:t>https://www.linkedin.com/in/mario-alexander-vargas-celis/</a:t>
+                      </a:r>
+                      <a:endParaRPr sz="1100" i="0" dirty="0">
                         <a:solidFill>
-                          <a:srgbClr val="CCCCCC"/>
+                          <a:schemeClr val="tx1"/>
                         </a:solidFill>
                         <a:latin typeface="Roboto"/>
                         <a:ea typeface="Roboto"/>
@@ -14103,7 +14640,7 @@
                   </a:ext>
                 </a:extLst>
               </a:tr>
-              <a:tr h="1092825">
+              <a:tr h="1173337">
                 <a:tc>
                   <a:txBody>
                     <a:bodyPr/>
@@ -14351,9 +14888,21 @@
                         </a:spcAft>
                         <a:buNone/>
                       </a:pPr>
-                      <a:endParaRPr sz="1100" i="1">
+                      <a:r>
+                        <a:rPr lang="es-ES" sz="1100" i="0" dirty="0">
+                          <a:solidFill>
+                            <a:schemeClr val="tx1"/>
+                          </a:solidFill>
+                          <a:latin typeface="Roboto"/>
+                          <a:ea typeface="Roboto"/>
+                          <a:cs typeface="Roboto"/>
+                          <a:sym typeface="Roboto"/>
+                        </a:rPr>
+                        <a:t>Cuales son los tiempos de entrega de los proyectos, saber como es el ambiente laboral y los nervios de no saber todo al instante</a:t>
+                      </a:r>
+                      <a:endParaRPr sz="1100" i="0" dirty="0">
                         <a:solidFill>
-                          <a:srgbClr val="D9D9D9"/>
+                          <a:schemeClr val="tx1"/>
                         </a:solidFill>
                         <a:latin typeface="Roboto"/>
                         <a:ea typeface="Roboto"/>
@@ -14704,9 +15253,33 @@
                         </a:spcAft>
                         <a:buNone/>
                       </a:pPr>
-                      <a:endParaRPr sz="1100" i="1">
+                      <a:r>
+                        <a:rPr lang="es-ES" sz="1100" i="0" dirty="0">
+                          <a:solidFill>
+                            <a:schemeClr val="tx1"/>
+                          </a:solidFill>
+                          <a:latin typeface="Roboto"/>
+                          <a:ea typeface="Roboto"/>
+                          <a:cs typeface="Roboto"/>
+                          <a:sym typeface="Roboto"/>
+                        </a:rPr>
+                        <a:t>Senior en data y machine </a:t>
+                      </a:r>
+                      <a:r>
+                        <a:rPr lang="es-ES" sz="1100" i="0" dirty="0" err="1">
+                          <a:solidFill>
+                            <a:schemeClr val="tx1"/>
+                          </a:solidFill>
+                          <a:latin typeface="Roboto"/>
+                          <a:ea typeface="Roboto"/>
+                          <a:cs typeface="Roboto"/>
+                          <a:sym typeface="Roboto"/>
+                        </a:rPr>
+                        <a:t>learning</a:t>
+                      </a:r>
+                      <a:endParaRPr sz="1100" i="0" dirty="0">
                         <a:solidFill>
-                          <a:srgbClr val="D9D9D9"/>
+                          <a:schemeClr val="tx1"/>
                         </a:solidFill>
                         <a:latin typeface="Roboto"/>
                         <a:ea typeface="Roboto"/>
@@ -14882,7 +15455,13 @@
         <p:nvGraphicFramePr>
           <p:cNvPr id="68" name="Google Shape;68;p9"/>
           <p:cNvGraphicFramePr/>
-          <p:nvPr/>
+          <p:nvPr>
+            <p:extLst>
+              <p:ext uri="{D42A27DB-BD31-4B8C-83A1-F6EECF244321}">
+                <p14:modId xmlns:p14="http://schemas.microsoft.com/office/powerpoint/2010/main" val="2900792963"/>
+              </p:ext>
+            </p:extLst>
+          </p:nvPr>
         </p:nvGraphicFramePr>
         <p:xfrm>
           <a:off x="497100" y="1162050"/>
@@ -15516,7 +16095,19 @@
                         <a:buNone/>
                       </a:pPr>
                       <a:r>
-                        <a:rPr lang="en" sz="1100" i="1">
+                        <a:rPr lang="en" sz="1100" i="0" dirty="0">
+                          <a:solidFill>
+                            <a:schemeClr val="tx1"/>
+                          </a:solidFill>
+                          <a:latin typeface="Roboto"/>
+                          <a:ea typeface="Roboto"/>
+                          <a:cs typeface="Roboto"/>
+                          <a:sym typeface="Roboto"/>
+                        </a:rPr>
+                        <a:t>OK</a:t>
+                      </a:r>
+                      <a:r>
+                        <a:rPr lang="en" sz="1100" i="1" dirty="0">
                           <a:solidFill>
                             <a:srgbClr val="CCCCCC"/>
                           </a:solidFill>
@@ -15525,9 +16116,9 @@
                           <a:cs typeface="Roboto"/>
                           <a:sym typeface="Roboto"/>
                         </a:rPr>
-                        <a:t>Escribe aquí tus respuestas.</a:t>
-                      </a:r>
-                      <a:endParaRPr sz="1100" i="1">
+                        <a:t>.</a:t>
+                      </a:r>
+                      <a:endParaRPr sz="1100" i="1" dirty="0">
                         <a:solidFill>
                           <a:srgbClr val="CCCCCC"/>
                         </a:solidFill>

</xml_diff>